<commit_message>
Updates to G2G blurb.
</commit_message>
<xml_diff>
--- a/teaching/handbookAdvert/NiceRcode.pptx
+++ b/teaching/handbookAdvert/NiceRcode.pptx
@@ -141,7 +141,7 @@
           <a:p>
             <a:fld id="{A927D443-5A13-8E4C-A8F1-2CE6BC8218AE}" type="datetimeFigureOut">
               <a:rPr lang="en-US" smtClean="0"/>
-              <a:t>25/02/13</a:t>
+              <a:t>26/02/13</a:t>
             </a:fld>
             <a:endParaRPr lang="en-US"/>
           </a:p>
@@ -898,7 +898,7 @@
           <a:p>
             <a:fld id="{A927D443-5A13-8E4C-A8F1-2CE6BC8218AE}" type="datetimeFigureOut">
               <a:rPr lang="en-US" smtClean="0"/>
-              <a:t>25/02/13</a:t>
+              <a:t>26/02/13</a:t>
             </a:fld>
             <a:endParaRPr lang="en-US"/>
           </a:p>
@@ -1522,7 +1522,7 @@
           <a:p>
             <a:fld id="{A927D443-5A13-8E4C-A8F1-2CE6BC8218AE}" type="datetimeFigureOut">
               <a:rPr lang="en-US" smtClean="0"/>
-              <a:t>25/02/13</a:t>
+              <a:t>26/02/13</a:t>
             </a:fld>
             <a:endParaRPr lang="en-US"/>
           </a:p>
@@ -1945,7 +1945,7 @@
           <a:p>
             <a:fld id="{A927D443-5A13-8E4C-A8F1-2CE6BC8218AE}" type="datetimeFigureOut">
               <a:rPr lang="en-US" smtClean="0"/>
-              <a:t>25/02/13</a:t>
+              <a:t>26/02/13</a:t>
             </a:fld>
             <a:endParaRPr lang="en-US"/>
           </a:p>
@@ -2122,7 +2122,7 @@
           <a:p>
             <a:fld id="{A927D443-5A13-8E4C-A8F1-2CE6BC8218AE}" type="datetimeFigureOut">
               <a:rPr lang="en-US" smtClean="0"/>
-              <a:t>25/02/13</a:t>
+              <a:t>26/02/13</a:t>
             </a:fld>
             <a:endParaRPr lang="en-US"/>
           </a:p>
@@ -2939,7 +2939,7 @@
           <a:p>
             <a:fld id="{A927D443-5A13-8E4C-A8F1-2CE6BC8218AE}" type="datetimeFigureOut">
               <a:rPr lang="en-US" smtClean="0"/>
-              <a:t>25/02/13</a:t>
+              <a:t>26/02/13</a:t>
             </a:fld>
             <a:endParaRPr lang="en-US"/>
           </a:p>
@@ -3450,7 +3450,7 @@
           <a:p>
             <a:fld id="{A927D443-5A13-8E4C-A8F1-2CE6BC8218AE}" type="datetimeFigureOut">
               <a:rPr lang="en-US" smtClean="0"/>
-              <a:t>25/02/13</a:t>
+              <a:t>26/02/13</a:t>
             </a:fld>
             <a:endParaRPr lang="en-US"/>
           </a:p>
@@ -3683,7 +3683,7 @@
           <a:p>
             <a:fld id="{A927D443-5A13-8E4C-A8F1-2CE6BC8218AE}" type="datetimeFigureOut">
               <a:rPr lang="en-US" smtClean="0"/>
-              <a:t>25/02/13</a:t>
+              <a:t>26/02/13</a:t>
             </a:fld>
             <a:endParaRPr lang="en-US"/>
           </a:p>
@@ -4208,7 +4208,7 @@
           <a:p>
             <a:fld id="{A927D443-5A13-8E4C-A8F1-2CE6BC8218AE}" type="datetimeFigureOut">
               <a:rPr lang="en-US" smtClean="0"/>
-              <a:t>25/02/13</a:t>
+              <a:t>26/02/13</a:t>
             </a:fld>
             <a:endParaRPr lang="en-US"/>
           </a:p>
@@ -4343,7 +4343,7 @@
           <a:p>
             <a:fld id="{A927D443-5A13-8E4C-A8F1-2CE6BC8218AE}" type="datetimeFigureOut">
               <a:rPr lang="en-US" smtClean="0"/>
-              <a:t>25/02/13</a:t>
+              <a:t>26/02/13</a:t>
             </a:fld>
             <a:endParaRPr lang="en-US"/>
           </a:p>
@@ -5241,7 +5241,7 @@
           <a:p>
             <a:fld id="{A927D443-5A13-8E4C-A8F1-2CE6BC8218AE}" type="datetimeFigureOut">
               <a:rPr lang="en-US" smtClean="0"/>
-              <a:t>25/02/13</a:t>
+              <a:t>26/02/13</a:t>
             </a:fld>
             <a:endParaRPr lang="en-US"/>
           </a:p>
@@ -5364,7 +5364,7 @@
           <a:p>
             <a:fld id="{A927D443-5A13-8E4C-A8F1-2CE6BC8218AE}" type="datetimeFigureOut">
               <a:rPr lang="en-US" smtClean="0"/>
-              <a:t>25/02/13</a:t>
+              <a:t>26/02/13</a:t>
             </a:fld>
             <a:endParaRPr lang="en-US"/>
           </a:p>
@@ -6248,7 +6248,7 @@
           <a:p>
             <a:fld id="{A927D443-5A13-8E4C-A8F1-2CE6BC8218AE}" type="datetimeFigureOut">
               <a:rPr lang="en-US" smtClean="0"/>
-              <a:t>25/02/13</a:t>
+              <a:t>26/02/13</a:t>
             </a:fld>
             <a:endParaRPr lang="en-US"/>
           </a:p>
@@ -6896,7 +6896,7 @@
           <a:p>
             <a:fld id="{A927D443-5A13-8E4C-A8F1-2CE6BC8218AE}" type="datetimeFigureOut">
               <a:rPr lang="en-US" smtClean="0"/>
-              <a:t>25/02/13</a:t>
+              <a:t>26/02/13</a:t>
             </a:fld>
             <a:endParaRPr lang="en-US"/>
           </a:p>
@@ -7212,7 +7212,7 @@
           <a:p>
             <a:fld id="{A927D443-5A13-8E4C-A8F1-2CE6BC8218AE}" type="datetimeFigureOut">
               <a:rPr lang="en-US" smtClean="0"/>
-              <a:t>25/02/13</a:t>
+              <a:t>26/02/13</a:t>
             </a:fld>
             <a:endParaRPr lang="en-US"/>
           </a:p>
@@ -7302,7 +7302,7 @@
           <a:p>
             <a:fld id="{A927D443-5A13-8E4C-A8F1-2CE6BC8218AE}" type="datetimeFigureOut">
               <a:rPr lang="en-US" smtClean="0"/>
-              <a:t>25/02/13</a:t>
+              <a:t>26/02/13</a:t>
             </a:fld>
             <a:endParaRPr lang="en-US"/>
           </a:p>
@@ -7630,7 +7630,7 @@
           <a:p>
             <a:fld id="{A927D443-5A13-8E4C-A8F1-2CE6BC8218AE}" type="datetimeFigureOut">
               <a:rPr lang="en-US" smtClean="0"/>
-              <a:t>25/02/13</a:t>
+              <a:t>26/02/13</a:t>
             </a:fld>
             <a:endParaRPr lang="en-US"/>
           </a:p>
@@ -8205,8 +8205,8 @@
         </p:nvSpPr>
         <p:spPr>
           <a:xfrm>
-            <a:off x="406743" y="1777752"/>
-            <a:ext cx="4410691" cy="4801315"/>
+            <a:off x="406743" y="1730605"/>
+            <a:ext cx="4410691" cy="5078314"/>
           </a:xfrm>
           <a:prstGeom prst="rect">
             <a:avLst/>
@@ -8273,15 +8273,7 @@
             </a:pPr>
             <a:r>
               <a:rPr lang="en-US" dirty="0" smtClean="0"/>
-              <a:t>Nicer code </a:t>
-            </a:r>
-            <a:r>
-              <a:rPr lang="en-US" dirty="0"/>
-              <a:t>= </a:t>
-            </a:r>
-            <a:r>
-              <a:rPr lang="en-US" dirty="0" smtClean="0"/>
-              <a:t>better science</a:t>
+              <a:t>Better science</a:t>
             </a:r>
           </a:p>
           <a:p>
@@ -8290,13 +8282,14 @@
               <a:buChar char="-"/>
             </a:pPr>
             <a:r>
-              <a:rPr lang="en-US" dirty="0" err="1" smtClean="0"/>
-              <a:t>Utilise</a:t>
-            </a:r>
-            <a:r>
               <a:rPr lang="en-US" dirty="0" smtClean="0"/>
-              <a:t> the wealth of data now available</a:t>
-            </a:r>
+              <a:t>M</a:t>
+            </a:r>
+            <a:r>
+              <a:rPr lang="en-US" dirty="0" smtClean="0"/>
+              <a:t>ore fun</a:t>
+            </a:r>
+            <a:endParaRPr lang="en-US" dirty="0" smtClean="0"/>
           </a:p>
           <a:p>
             <a:pPr marL="285750" indent="-285750">
@@ -8305,7 +8298,7 @@
             </a:pPr>
             <a:r>
               <a:rPr lang="en-US" dirty="0" smtClean="0"/>
-              <a:t>Save time</a:t>
+              <a:t>Bigger datasets </a:t>
             </a:r>
           </a:p>
           <a:p>
@@ -8315,18 +8308,9 @@
             </a:pPr>
             <a:r>
               <a:rPr lang="en-US" dirty="0" smtClean="0"/>
-              <a:t>Future employment</a:t>
-            </a:r>
-            <a:endParaRPr lang="en-US" dirty="0"/>
-          </a:p>
-          <a:p>
+              <a:t>Become more efficient</a:t>
+            </a:r>
             <a:endParaRPr lang="en-US" dirty="0" smtClean="0"/>
-          </a:p>
-          <a:p>
-            <a:r>
-              <a:rPr lang="en-US" dirty="0" smtClean="0"/>
-              <a:t>What:</a:t>
-            </a:r>
           </a:p>
           <a:p>
             <a:pPr marL="285750" indent="-285750">
@@ -8335,15 +8319,17 @@
             </a:pPr>
             <a:r>
               <a:rPr lang="en-US" dirty="0" smtClean="0"/>
-              <a:t>10 </a:t>
-            </a:r>
-            <a:r>
-              <a:rPr lang="en-US" dirty="0"/>
-              <a:t>x 1hr </a:t>
-            </a:r>
+              <a:t>Future employment</a:t>
+            </a:r>
+            <a:endParaRPr lang="en-US" dirty="0"/>
+          </a:p>
+          <a:p>
+            <a:endParaRPr lang="en-US" dirty="0" smtClean="0"/>
+          </a:p>
+          <a:p>
             <a:r>
               <a:rPr lang="en-US" dirty="0" smtClean="0"/>
-              <a:t>sessions</a:t>
+              <a:t>What:</a:t>
             </a:r>
           </a:p>
           <a:p>
@@ -8353,7 +8339,15 @@
             </a:pPr>
             <a:r>
               <a:rPr lang="en-US" dirty="0" smtClean="0"/>
-              <a:t>New skills (15min)</a:t>
+              <a:t>10 </a:t>
+            </a:r>
+            <a:r>
+              <a:rPr lang="en-US" dirty="0"/>
+              <a:t>x 1hr </a:t>
+            </a:r>
+            <a:r>
+              <a:rPr lang="en-US" dirty="0" smtClean="0"/>
+              <a:t>sessions</a:t>
             </a:r>
           </a:p>
           <a:p>
@@ -8363,8 +8357,23 @@
             </a:pPr>
             <a:r>
               <a:rPr lang="en-US" dirty="0" smtClean="0"/>
-              <a:t>Code review (40min)</a:t>
-            </a:r>
+              <a:t>New </a:t>
+            </a:r>
+            <a:r>
+              <a:rPr lang="en-US" dirty="0" smtClean="0"/>
+              <a:t>skills + code review</a:t>
+            </a:r>
+          </a:p>
+          <a:p>
+            <a:pPr marL="285750" indent="-285750">
+              <a:buFontTx/>
+              <a:buChar char="-"/>
+            </a:pPr>
+            <a:r>
+              <a:rPr lang="en-US" dirty="0" smtClean="0"/>
+              <a:t>Participant driven focus</a:t>
+            </a:r>
+            <a:endParaRPr lang="en-US" dirty="0" smtClean="0"/>
           </a:p>
           <a:p>
             <a:pPr marL="285750" indent="-285750">
@@ -8401,8 +8410,8 @@
         </p:nvSpPr>
         <p:spPr>
           <a:xfrm>
-            <a:off x="4832032" y="1779812"/>
-            <a:ext cx="4029125" cy="4524316"/>
+            <a:off x="4817436" y="4269762"/>
+            <a:ext cx="4029125" cy="1754327"/>
           </a:xfrm>
           <a:prstGeom prst="rect">
             <a:avLst/>
@@ -8423,36 +8432,13 @@
           </a:bodyPr>
           <a:lstStyle/>
           <a:p>
-            <a:endParaRPr lang="en-US" dirty="0" smtClean="0"/>
-          </a:p>
-          <a:p>
-            <a:endParaRPr lang="en-US" dirty="0"/>
-          </a:p>
-          <a:p>
-            <a:endParaRPr lang="en-US" dirty="0" smtClean="0"/>
-          </a:p>
-          <a:p>
-            <a:endParaRPr lang="en-US" dirty="0"/>
-          </a:p>
-          <a:p>
-            <a:endParaRPr lang="en-US" dirty="0" smtClean="0"/>
-          </a:p>
-          <a:p>
-            <a:endParaRPr lang="en-US" dirty="0" smtClean="0"/>
-          </a:p>
-          <a:p>
-            <a:endParaRPr lang="en-US" dirty="0" smtClean="0"/>
-          </a:p>
-          <a:p>
-            <a:endParaRPr lang="en-US" dirty="0"/>
-          </a:p>
-          <a:p>
-            <a:endParaRPr lang="en-US" dirty="0" smtClean="0"/>
-          </a:p>
-          <a:p>
             <a:r>
               <a:rPr lang="en-US" dirty="0" smtClean="0"/>
-              <a:t>Dates: every 2</a:t>
+              <a:t>Dates</a:t>
+            </a:r>
+            <a:r>
+              <a:rPr lang="en-US" dirty="0" smtClean="0"/>
+              <a:t>: every 2</a:t>
             </a:r>
             <a:r>
               <a:rPr lang="en-US" baseline="30000" dirty="0" smtClean="0"/>
@@ -8460,7 +8446,15 @@
             </a:r>
             <a:r>
               <a:rPr lang="en-US" dirty="0" smtClean="0"/>
-              <a:t> Tues, 1-2pm, April - July</a:t>
+              <a:t> Tues, </a:t>
+            </a:r>
+            <a:r>
+              <a:rPr lang="en-US" dirty="0" smtClean="0"/>
+              <a:t>2-3pm</a:t>
+            </a:r>
+            <a:r>
+              <a:rPr lang="en-US" dirty="0" smtClean="0"/>
+              <a:t>, April - July</a:t>
             </a:r>
           </a:p>
           <a:p>
@@ -8494,19 +8488,63 @@
               <a:t>Pre-requisites: </a:t>
             </a:r>
             <a:r>
+              <a:rPr lang="en-US" b="1" dirty="0" smtClean="0"/>
+              <a:t>Already using R</a:t>
+            </a:r>
+            <a:r>
+              <a:rPr lang="en-US" dirty="0" smtClean="0"/>
+              <a:t>, Open </a:t>
+            </a:r>
+            <a:r>
+              <a:rPr lang="en-US" dirty="0" smtClean="0"/>
+              <a:t>to peer </a:t>
+            </a:r>
+            <a:r>
+              <a:rPr lang="en-US" dirty="0" smtClean="0"/>
+              <a:t>review</a:t>
+            </a:r>
+            <a:r>
+              <a:rPr lang="en-US" dirty="0" smtClean="0"/>
+              <a:t>, </a:t>
+            </a:r>
+            <a:r>
               <a:rPr lang="en-US" dirty="0"/>
-              <a:t>E</a:t>
-            </a:r>
-            <a:r>
-              <a:rPr lang="en-US" dirty="0" smtClean="0"/>
-              <a:t>nthusiasm. Open to peer review. </a:t>
-            </a:r>
-          </a:p>
-          <a:p>
-            <a:endParaRPr lang="en-US" dirty="0"/>
-          </a:p>
-        </p:txBody>
-      </p:sp>
+              <a:t>Enthusiasm. </a:t>
+            </a:r>
+            <a:endParaRPr lang="en-US" dirty="0" smtClean="0"/>
+          </a:p>
+        </p:txBody>
+      </p:sp>
+      <p:pic>
+        <p:nvPicPr>
+          <p:cNvPr id="4" name="Picture 3" descr="primates-tree.pdf"/>
+          <p:cNvPicPr>
+            <a:picLocks noChangeAspect="1"/>
+          </p:cNvPicPr>
+          <p:nvPr/>
+        </p:nvPicPr>
+        <p:blipFill>
+          <a:blip r:embed="rId2">
+            <a:extLst>
+              <a:ext uri="{28A0092B-C50C-407E-A947-70E740481C1C}">
+                <a14:useLocalDpi xmlns:a14="http://schemas.microsoft.com/office/drawing/2010/main" val="0"/>
+              </a:ext>
+            </a:extLst>
+          </a:blip>
+          <a:stretch>
+            <a:fillRect/>
+          </a:stretch>
+        </p:blipFill>
+        <p:spPr>
+          <a:xfrm>
+            <a:off x="5226186" y="1777752"/>
+            <a:ext cx="3287518" cy="2191678"/>
+          </a:xfrm>
+          <a:prstGeom prst="rect">
+            <a:avLst/>
+          </a:prstGeom>
+        </p:spPr>
+      </p:pic>
     </p:spTree>
     <p:extLst>
       <p:ext uri="{BB962C8B-B14F-4D97-AF65-F5344CB8AC3E}">

</xml_diff>